<commit_message>
Updated Bayesian calibration example
</commit_message>
<xml_diff>
--- a/tutorials/Sensitivity Analysis.pptx
+++ b/tutorials/Sensitivity Analysis.pptx
@@ -435,7 +435,7 @@
               <a:pPr>
                 <a:defRPr/>
               </a:pPr>
-              <a:t>9/10/2019</a:t>
+              <a:t>9/16/2019</a:t>
             </a:fld>
             <a:endParaRPr lang="en-US"/>
           </a:p>
@@ -671,7 +671,7 @@
               <a:pPr>
                 <a:defRPr/>
               </a:pPr>
-              <a:t>9/10/2019</a:t>
+              <a:t>9/16/2019</a:t>
             </a:fld>
             <a:endParaRPr lang="en-US"/>
           </a:p>
@@ -2054,7 +2054,7 @@
               <a:pPr>
                 <a:defRPr/>
               </a:pPr>
-              <a:t>9/10/2019</a:t>
+              <a:t>9/16/2019</a:t>
             </a:fld>
             <a:endParaRPr lang="en-US"/>
           </a:p>
@@ -3427,7 +3427,7 @@
               <a:pPr>
                 <a:defRPr/>
               </a:pPr>
-              <a:t>9/10/2019</a:t>
+              <a:t>9/16/2019</a:t>
             </a:fld>
             <a:endParaRPr lang="en-US"/>
           </a:p>
@@ -3910,7 +3910,7 @@
               <a:pPr>
                 <a:defRPr/>
               </a:pPr>
-              <a:t>9/10/2019</a:t>
+              <a:t>9/16/2019</a:t>
             </a:fld>
             <a:endParaRPr lang="en-US"/>
           </a:p>
@@ -4216,7 +4216,7 @@
               <a:pPr>
                 <a:defRPr/>
               </a:pPr>
-              <a:t>9/10/2019</a:t>
+              <a:t>9/16/2019</a:t>
             </a:fld>
             <a:endParaRPr lang="en-US"/>
           </a:p>
@@ -4554,7 +4554,7 @@
               <a:pPr>
                 <a:defRPr/>
               </a:pPr>
-              <a:t>9/10/2019</a:t>
+              <a:t>9/16/2019</a:t>
             </a:fld>
             <a:endParaRPr lang="en-US"/>
           </a:p>
@@ -5059,7 +5059,7 @@
               <a:pPr>
                 <a:defRPr/>
               </a:pPr>
-              <a:t>9/10/2019</a:t>
+              <a:t>9/16/2019</a:t>
             </a:fld>
             <a:endParaRPr lang="en-US"/>
           </a:p>
@@ -5314,7 +5314,7 @@
               <a:pPr>
                 <a:defRPr/>
               </a:pPr>
-              <a:t>9/10/2019</a:t>
+              <a:t>9/16/2019</a:t>
             </a:fld>
             <a:endParaRPr lang="en-US"/>
           </a:p>
@@ -6135,7 +6135,7 @@
               <a:pPr>
                 <a:defRPr/>
               </a:pPr>
-              <a:t>9/10/2019</a:t>
+              <a:t>9/16/2019</a:t>
             </a:fld>
             <a:endParaRPr lang="en-US"/>
           </a:p>
@@ -6614,7 +6614,7 @@
               <a:pPr>
                 <a:defRPr/>
               </a:pPr>
-              <a:t>9/10/2019</a:t>
+              <a:t>9/16/2019</a:t>
             </a:fld>
             <a:endParaRPr lang="en-US"/>
           </a:p>
@@ -6912,7 +6912,7 @@
               <a:pPr>
                 <a:defRPr/>
               </a:pPr>
-              <a:t>9/10/2019</a:t>
+              <a:t>9/16/2019</a:t>
             </a:fld>
             <a:endParaRPr lang="en-US"/>
           </a:p>
@@ -7246,7 +7246,7 @@
               <a:pPr>
                 <a:defRPr/>
               </a:pPr>
-              <a:t>9/10/2019</a:t>
+              <a:t>9/16/2019</a:t>
             </a:fld>
             <a:endParaRPr lang="en-US"/>
           </a:p>
@@ -7561,7 +7561,7 @@
               <a:pPr>
                 <a:defRPr/>
               </a:pPr>
-              <a:t>9/10/2019</a:t>
+              <a:t>9/16/2019</a:t>
             </a:fld>
             <a:endParaRPr lang="en-US"/>
           </a:p>
@@ -11180,10 +11180,10 @@
       </p:sp>
       <p:graphicFrame>
         <p:nvGraphicFramePr>
-          <p:cNvPr id="8" name="Table 7">
+          <p:cNvPr id="4" name="Table 3">
             <a:extLst>
               <a:ext uri="{FF2B5EF4-FFF2-40B4-BE49-F238E27FC236}">
-                <a16:creationId xmlns:a16="http://schemas.microsoft.com/office/drawing/2014/main" id="{DEA76D35-71D2-4434-B624-967C792F8024}"/>
+                <a16:creationId xmlns:a16="http://schemas.microsoft.com/office/drawing/2014/main" id="{5F634AD5-CC9D-4DBA-9865-E0972F91BE83}"/>
               </a:ext>
             </a:extLst>
           </p:cNvPr>
@@ -11193,78 +11193,78 @@
           <p:nvPr>
             <p:extLst>
               <p:ext uri="{D42A27DB-BD31-4B8C-83A1-F6EECF244321}">
-                <p14:modId xmlns:p14="http://schemas.microsoft.com/office/powerpoint/2010/main" val="787558186"/>
+                <p14:modId xmlns:p14="http://schemas.microsoft.com/office/powerpoint/2010/main" val="2495667487"/>
               </p:ext>
             </p:extLst>
           </p:nvPr>
         </p:nvGraphicFramePr>
         <p:xfrm>
-          <a:off x="381002" y="3634163"/>
-          <a:ext cx="8229598" cy="897775"/>
+          <a:off x="457200" y="3664500"/>
+          <a:ext cx="8229599" cy="990300"/>
         </p:xfrm>
         <a:graphic>
           <a:graphicData uri="http://schemas.openxmlformats.org/drawingml/2006/table">
             <a:tbl>
               <a:tblPr/>
               <a:tblGrid>
-                <a:gridCol w="2032462">
+                <a:gridCol w="2533066">
                   <a:extLst>
                     <a:ext uri="{9D8B030D-6E8A-4147-A177-3AD203B41FA5}">
-                      <a16:colId xmlns:a16="http://schemas.microsoft.com/office/drawing/2014/main" val="589979763"/>
+                      <a16:colId xmlns:a16="http://schemas.microsoft.com/office/drawing/2014/main" val="1594655470"/>
                     </a:ext>
                   </a:extLst>
                 </a:gridCol>
-                <a:gridCol w="1209502">
+                <a:gridCol w="1111798">
                   <a:extLst>
                     <a:ext uri="{9D8B030D-6E8A-4147-A177-3AD203B41FA5}">
-                      <a16:colId xmlns:a16="http://schemas.microsoft.com/office/drawing/2014/main" val="704971353"/>
+                      <a16:colId xmlns:a16="http://schemas.microsoft.com/office/drawing/2014/main" val="3175602916"/>
                     </a:ext>
                   </a:extLst>
                 </a:gridCol>
-                <a:gridCol w="1284316">
+                <a:gridCol w="1180569">
                   <a:extLst>
                     <a:ext uri="{9D8B030D-6E8A-4147-A177-3AD203B41FA5}">
-                      <a16:colId xmlns:a16="http://schemas.microsoft.com/office/drawing/2014/main" val="2029312889"/>
+                      <a16:colId xmlns:a16="http://schemas.microsoft.com/office/drawing/2014/main" val="1875164654"/>
                     </a:ext>
                   </a:extLst>
                 </a:gridCol>
-                <a:gridCol w="1022465">
+                <a:gridCol w="939871">
                   <a:extLst>
                     <a:ext uri="{9D8B030D-6E8A-4147-A177-3AD203B41FA5}">
-                      <a16:colId xmlns:a16="http://schemas.microsoft.com/office/drawing/2014/main" val="1698700376"/>
+                      <a16:colId xmlns:a16="http://schemas.microsoft.com/office/drawing/2014/main" val="1040717010"/>
                     </a:ext>
                   </a:extLst>
                 </a:gridCol>
-                <a:gridCol w="885305">
+                <a:gridCol w="813791">
                   <a:extLst>
                     <a:ext uri="{9D8B030D-6E8A-4147-A177-3AD203B41FA5}">
-                      <a16:colId xmlns:a16="http://schemas.microsoft.com/office/drawing/2014/main" val="1112760599"/>
+                      <a16:colId xmlns:a16="http://schemas.microsoft.com/office/drawing/2014/main" val="1961329927"/>
                     </a:ext>
                   </a:extLst>
                 </a:gridCol>
-                <a:gridCol w="598516">
+                <a:gridCol w="550168">
                   <a:extLst>
                     <a:ext uri="{9D8B030D-6E8A-4147-A177-3AD203B41FA5}">
-                      <a16:colId xmlns:a16="http://schemas.microsoft.com/office/drawing/2014/main" val="720349455"/>
+                      <a16:colId xmlns:a16="http://schemas.microsoft.com/office/drawing/2014/main" val="1796319276"/>
                     </a:ext>
                   </a:extLst>
                 </a:gridCol>
-                <a:gridCol w="598516">
+                <a:gridCol w="550168">
                   <a:extLst>
                     <a:ext uri="{9D8B030D-6E8A-4147-A177-3AD203B41FA5}">
-                      <a16:colId xmlns:a16="http://schemas.microsoft.com/office/drawing/2014/main" val="2846955000"/>
+                      <a16:colId xmlns:a16="http://schemas.microsoft.com/office/drawing/2014/main" val="1881563303"/>
                     </a:ext>
                   </a:extLst>
                 </a:gridCol>
-                <a:gridCol w="598516">
+                <a:gridCol w="550168">
                   <a:extLst>
                     <a:ext uri="{9D8B030D-6E8A-4147-A177-3AD203B41FA5}">
-                      <a16:colId xmlns:a16="http://schemas.microsoft.com/office/drawing/2014/main" val="227816765"/>
+                      <a16:colId xmlns:a16="http://schemas.microsoft.com/office/drawing/2014/main" val="38392976"/>
                     </a:ext>
                   </a:extLst>
                 </a:gridCol>
               </a:tblGrid>
-              <a:tr h="179555">
+              <a:tr h="165050">
                 <a:tc>
                   <a:txBody>
                     <a:bodyPr/>
@@ -11272,7 +11272,7 @@
                     <a:p>
                       <a:pPr algn="l" fontAlgn="b"/>
                       <a:r>
-                        <a:rPr lang="en-US" sz="1100" b="0" i="0" u="none" strike="noStrike">
+                        <a:rPr lang="en-US" sz="1000" b="0" i="0" u="none" strike="noStrike">
                           <a:solidFill>
                             <a:srgbClr val="000000"/>
                           </a:solidFill>
@@ -11283,7 +11283,7 @@
                       </a:r>
                     </a:p>
                   </a:txBody>
-                  <a:tcPr marL="7481" marR="7481" marT="7481" marB="0" anchor="b">
+                  <a:tcPr marL="6877" marR="6877" marT="6877" marB="0" anchor="b">
                     <a:lnL>
                       <a:noFill/>
                     </a:lnL>
@@ -11305,7 +11305,7 @@
                     <a:p>
                       <a:pPr algn="l" fontAlgn="b"/>
                       <a:r>
-                        <a:rPr lang="en-US" sz="1100" b="0" i="0" u="none" strike="noStrike">
+                        <a:rPr lang="en-US" sz="1000" b="0" i="0" u="none" strike="noStrike">
                           <a:solidFill>
                             <a:srgbClr val="000000"/>
                           </a:solidFill>
@@ -11316,7 +11316,7 @@
                       </a:r>
                     </a:p>
                   </a:txBody>
-                  <a:tcPr marL="7481" marR="7481" marT="7481" marB="0" anchor="b">
+                  <a:tcPr marL="6877" marR="6877" marT="6877" marB="0" anchor="b">
                     <a:lnL>
                       <a:noFill/>
                     </a:lnL>
@@ -11338,7 +11338,7 @@
                     <a:p>
                       <a:pPr algn="l" fontAlgn="b"/>
                       <a:r>
-                        <a:rPr lang="en-US" sz="1100" b="0" i="0" u="none" strike="noStrike">
+                        <a:rPr lang="en-US" sz="1000" b="0" i="0" u="none" strike="noStrike">
                           <a:solidFill>
                             <a:srgbClr val="000000"/>
                           </a:solidFill>
@@ -11349,7 +11349,7 @@
                       </a:r>
                     </a:p>
                   </a:txBody>
-                  <a:tcPr marL="7481" marR="7481" marT="7481" marB="0" anchor="b">
+                  <a:tcPr marL="6877" marR="6877" marT="6877" marB="0" anchor="b">
                     <a:lnL>
                       <a:noFill/>
                     </a:lnL>
@@ -11371,7 +11371,7 @@
                     <a:p>
                       <a:pPr algn="l" fontAlgn="b"/>
                       <a:r>
-                        <a:rPr lang="en-US" sz="1100" b="0" i="0" u="none" strike="noStrike">
+                        <a:rPr lang="en-US" sz="1000" b="0" i="0" u="none" strike="noStrike">
                           <a:solidFill>
                             <a:srgbClr val="000000"/>
                           </a:solidFill>
@@ -11382,7 +11382,7 @@
                       </a:r>
                     </a:p>
                   </a:txBody>
-                  <a:tcPr marL="7481" marR="7481" marT="7481" marB="0" anchor="b">
+                  <a:tcPr marL="6877" marR="6877" marT="6877" marB="0" anchor="b">
                     <a:lnL>
                       <a:noFill/>
                     </a:lnL>
@@ -11404,7 +11404,7 @@
                     <a:p>
                       <a:pPr algn="l" fontAlgn="b"/>
                       <a:r>
-                        <a:rPr lang="en-US" sz="1100" b="0" i="0" u="none" strike="noStrike">
+                        <a:rPr lang="en-US" sz="1000" b="0" i="0" u="none" strike="noStrike">
                           <a:solidFill>
                             <a:srgbClr val="000000"/>
                           </a:solidFill>
@@ -11415,7 +11415,7 @@
                       </a:r>
                     </a:p>
                   </a:txBody>
-                  <a:tcPr marL="7481" marR="7481" marT="7481" marB="0" anchor="b">
+                  <a:tcPr marL="6877" marR="6877" marT="6877" marB="0" anchor="b">
                     <a:lnL>
                       <a:noFill/>
                     </a:lnL>
@@ -11437,7 +11437,7 @@
                     <a:p>
                       <a:pPr algn="l" fontAlgn="b"/>
                       <a:r>
-                        <a:rPr lang="en-US" sz="1100" b="0" i="0" u="none" strike="noStrike">
+                        <a:rPr lang="en-US" sz="1000" b="0" i="0" u="none" strike="noStrike">
                           <a:solidFill>
                             <a:srgbClr val="000000"/>
                           </a:solidFill>
@@ -11448,7 +11448,7 @@
                       </a:r>
                     </a:p>
                   </a:txBody>
-                  <a:tcPr marL="7481" marR="7481" marT="7481" marB="0" anchor="b">
+                  <a:tcPr marL="6877" marR="6877" marT="6877" marB="0" anchor="b">
                     <a:lnL>
                       <a:noFill/>
                     </a:lnL>
@@ -11470,7 +11470,7 @@
                     <a:p>
                       <a:pPr algn="l" fontAlgn="b"/>
                       <a:r>
-                        <a:rPr lang="en-US" sz="1100" b="0" i="0" u="none" strike="noStrike">
+                        <a:rPr lang="en-US" sz="1000" b="0" i="0" u="none" strike="noStrike">
                           <a:solidFill>
                             <a:srgbClr val="000000"/>
                           </a:solidFill>
@@ -11481,7 +11481,7 @@
                       </a:r>
                     </a:p>
                   </a:txBody>
-                  <a:tcPr marL="7481" marR="7481" marT="7481" marB="0" anchor="b">
+                  <a:tcPr marL="6877" marR="6877" marT="6877" marB="0" anchor="b">
                     <a:lnL>
                       <a:noFill/>
                     </a:lnL>
@@ -11503,7 +11503,7 @@
                     <a:p>
                       <a:pPr algn="l" fontAlgn="b"/>
                       <a:r>
-                        <a:rPr lang="en-US" sz="1100" b="0" i="0" u="none" strike="noStrike">
+                        <a:rPr lang="en-US" sz="1000" b="0" i="0" u="none" strike="noStrike">
                           <a:solidFill>
                             <a:srgbClr val="000000"/>
                           </a:solidFill>
@@ -11514,7 +11514,7 @@
                       </a:r>
                     </a:p>
                   </a:txBody>
-                  <a:tcPr marL="7481" marR="7481" marT="7481" marB="0" anchor="b">
+                  <a:tcPr marL="6877" marR="6877" marT="6877" marB="0" anchor="b">
                     <a:lnL>
                       <a:noFill/>
                     </a:lnL>
@@ -11531,11 +11531,11 @@
                 </a:tc>
                 <a:extLst>
                   <a:ext uri="{0D108BD9-81ED-4DB2-BD59-A6C34878D82A}">
-                    <a16:rowId xmlns:a16="http://schemas.microsoft.com/office/drawing/2014/main" val="282545367"/>
+                    <a16:rowId xmlns:a16="http://schemas.microsoft.com/office/drawing/2014/main" val="1467340810"/>
                   </a:ext>
                 </a:extLst>
               </a:tr>
-              <a:tr h="179555">
+              <a:tr h="165050">
                 <a:tc>
                   <a:txBody>
                     <a:bodyPr/>
@@ -11543,7 +11543,7 @@
                     <a:p>
                       <a:pPr algn="l" fontAlgn="b"/>
                       <a:r>
-                        <a:rPr lang="en-US" sz="1100" b="0" i="0" u="none" strike="noStrike">
+                        <a:rPr lang="en-US" sz="1000" b="0" i="0" u="none" strike="noStrike" dirty="0">
                           <a:solidFill>
                             <a:srgbClr val="000000"/>
                           </a:solidFill>
@@ -11554,7 +11554,7 @@
                       </a:r>
                     </a:p>
                   </a:txBody>
-                  <a:tcPr marL="7481" marR="7481" marT="7481" marB="0" anchor="b">
+                  <a:tcPr marL="6877" marR="6877" marT="6877" marB="0" anchor="b">
                     <a:lnL>
                       <a:noFill/>
                     </a:lnL>
@@ -11576,7 +11576,7 @@
                     <a:p>
                       <a:pPr algn="l" fontAlgn="b"/>
                       <a:r>
-                        <a:rPr lang="en-US" sz="1100" b="0" i="0" u="none" strike="noStrike">
+                        <a:rPr lang="en-US" sz="1000" b="0" i="0" u="none" strike="noStrike">
                           <a:solidFill>
                             <a:srgbClr val="000000"/>
                           </a:solidFill>
@@ -11587,7 +11587,7 @@
                       </a:r>
                     </a:p>
                   </a:txBody>
-                  <a:tcPr marL="7481" marR="7481" marT="7481" marB="0" anchor="b">
+                  <a:tcPr marL="6877" marR="6877" marT="6877" marB="0" anchor="b">
                     <a:lnL>
                       <a:noFill/>
                     </a:lnL>
@@ -11608,7 +11608,7 @@
                     <a:lstStyle/>
                     <a:p>
                       <a:pPr algn="l" fontAlgn="b"/>
-                      <a:endParaRPr lang="en-US" sz="1100" b="0" i="0" u="none" strike="noStrike">
+                      <a:endParaRPr lang="en-US" sz="1000" b="0" i="0" u="none" strike="noStrike">
                         <a:solidFill>
                           <a:srgbClr val="000000"/>
                         </a:solidFill>
@@ -11617,7 +11617,7 @@
                       </a:endParaRPr>
                     </a:p>
                   </a:txBody>
-                  <a:tcPr marL="7481" marR="7481" marT="7481" marB="0" anchor="b">
+                  <a:tcPr marL="6877" marR="6877" marT="6877" marB="0" anchor="b">
                     <a:lnL>
                       <a:noFill/>
                     </a:lnL>
@@ -11639,7 +11639,7 @@
                     <a:p>
                       <a:pPr algn="l" fontAlgn="b"/>
                       <a:r>
-                        <a:rPr lang="en-US" sz="1100" b="0" i="0" u="none" strike="noStrike">
+                        <a:rPr lang="en-US" sz="1000" b="0" i="0" u="none" strike="noStrike">
                           <a:solidFill>
                             <a:srgbClr val="000000"/>
                           </a:solidFill>
@@ -11650,7 +11650,7 @@
                       </a:r>
                     </a:p>
                   </a:txBody>
-                  <a:tcPr marL="7481" marR="7481" marT="7481" marB="0" anchor="b">
+                  <a:tcPr marL="6877" marR="6877" marT="6877" marB="0" anchor="b">
                     <a:lnL>
                       <a:noFill/>
                     </a:lnL>
@@ -11672,7 +11672,7 @@
                     <a:p>
                       <a:pPr algn="r" fontAlgn="b"/>
                       <a:r>
-                        <a:rPr lang="en-US" sz="1100" b="0" i="0" u="none" strike="noStrike">
+                        <a:rPr lang="en-US" sz="1000" b="0" i="0" u="none" strike="noStrike">
                           <a:solidFill>
                             <a:srgbClr val="000000"/>
                           </a:solidFill>
@@ -11683,7 +11683,7 @@
                       </a:r>
                     </a:p>
                   </a:txBody>
-                  <a:tcPr marL="7481" marR="7481" marT="7481" marB="0" anchor="b">
+                  <a:tcPr marL="6877" marR="6877" marT="6877" marB="0" anchor="b">
                     <a:lnL>
                       <a:noFill/>
                     </a:lnL>
@@ -11704,7 +11704,7 @@
                     <a:lstStyle/>
                     <a:p>
                       <a:pPr algn="l" fontAlgn="b"/>
-                      <a:endParaRPr lang="en-US" sz="1100" b="0" i="0" u="none" strike="noStrike">
+                      <a:endParaRPr lang="en-US" sz="1000" b="0" i="0" u="none" strike="noStrike">
                         <a:solidFill>
                           <a:srgbClr val="000000"/>
                         </a:solidFill>
@@ -11713,7 +11713,7 @@
                       </a:endParaRPr>
                     </a:p>
                   </a:txBody>
-                  <a:tcPr marL="7481" marR="7481" marT="7481" marB="0" anchor="b">
+                  <a:tcPr marL="6877" marR="6877" marT="6877" marB="0" anchor="b">
                     <a:lnL>
                       <a:noFill/>
                     </a:lnL>
@@ -11735,7 +11735,7 @@
                     <a:p>
                       <a:pPr algn="r" fontAlgn="b"/>
                       <a:r>
-                        <a:rPr lang="en-US" sz="1100" b="0" i="0" u="none" strike="noStrike">
+                        <a:rPr lang="en-US" sz="1000" b="0" i="0" u="none" strike="noStrike">
                           <a:solidFill>
                             <a:srgbClr val="000000"/>
                           </a:solidFill>
@@ -11746,7 +11746,7 @@
                       </a:r>
                     </a:p>
                   </a:txBody>
-                  <a:tcPr marL="7481" marR="7481" marT="7481" marB="0" anchor="b">
+                  <a:tcPr marL="6877" marR="6877" marT="6877" marB="0" anchor="b">
                     <a:lnL>
                       <a:noFill/>
                     </a:lnL>
@@ -11768,7 +11768,7 @@
                     <a:p>
                       <a:pPr algn="r" fontAlgn="b"/>
                       <a:r>
-                        <a:rPr lang="en-US" sz="1100" b="0" i="0" u="none" strike="noStrike">
+                        <a:rPr lang="en-US" sz="1000" b="0" i="0" u="none" strike="noStrike">
                           <a:solidFill>
                             <a:srgbClr val="000000"/>
                           </a:solidFill>
@@ -11779,7 +11779,7 @@
                       </a:r>
                     </a:p>
                   </a:txBody>
-                  <a:tcPr marL="7481" marR="7481" marT="7481" marB="0" anchor="b">
+                  <a:tcPr marL="6877" marR="6877" marT="6877" marB="0" anchor="b">
                     <a:lnL>
                       <a:noFill/>
                     </a:lnL>
@@ -11796,11 +11796,11 @@
                 </a:tc>
                 <a:extLst>
                   <a:ext uri="{0D108BD9-81ED-4DB2-BD59-A6C34878D82A}">
-                    <a16:rowId xmlns:a16="http://schemas.microsoft.com/office/drawing/2014/main" val="2772551878"/>
+                    <a16:rowId xmlns:a16="http://schemas.microsoft.com/office/drawing/2014/main" val="4218968848"/>
                   </a:ext>
                 </a:extLst>
               </a:tr>
-              <a:tr h="179555">
+              <a:tr h="165050">
                 <a:tc>
                   <a:txBody>
                     <a:bodyPr/>
@@ -11808,7 +11808,7 @@
                     <a:p>
                       <a:pPr algn="l" fontAlgn="b"/>
                       <a:r>
-                        <a:rPr lang="en-US" sz="1100" b="0" i="0" u="none" strike="noStrike" dirty="0" err="1">
+                        <a:rPr lang="en-US" sz="1000" b="0" i="0" u="none" strike="noStrike">
                           <a:solidFill>
                             <a:srgbClr val="000000"/>
                           </a:solidFill>
@@ -11817,16 +11817,9 @@
                         </a:rPr>
                         <a:t>Lights_WattsPerSpaceFloorArea</a:t>
                       </a:r>
-                      <a:endParaRPr lang="en-US" sz="1100" b="0" i="0" u="none" strike="noStrike" dirty="0">
-                        <a:solidFill>
-                          <a:srgbClr val="000000"/>
-                        </a:solidFill>
-                        <a:effectLst/>
-                        <a:latin typeface="Calibri" panose="020F0502020204030204" pitchFamily="34" charset="0"/>
-                      </a:endParaRPr>
                     </a:p>
                   </a:txBody>
-                  <a:tcPr marL="7481" marR="7481" marT="7481" marB="0" anchor="b">
+                  <a:tcPr marL="6877" marR="6877" marT="6877" marB="0" anchor="b">
                     <a:lnL>
                       <a:noFill/>
                     </a:lnL>
@@ -11848,7 +11841,7 @@
                     <a:p>
                       <a:pPr algn="l" fontAlgn="b"/>
                       <a:r>
-                        <a:rPr lang="en-US" sz="1100" b="0" i="0" u="none" strike="noStrike">
+                        <a:rPr lang="en-US" sz="1000" b="0" i="0" u="none" strike="noStrike">
                           <a:solidFill>
                             <a:srgbClr val="000000"/>
                           </a:solidFill>
@@ -11859,7 +11852,7 @@
                       </a:r>
                     </a:p>
                   </a:txBody>
-                  <a:tcPr marL="7481" marR="7481" marT="7481" marB="0" anchor="b">
+                  <a:tcPr marL="6877" marR="6877" marT="6877" marB="0" anchor="b">
                     <a:lnL>
                       <a:noFill/>
                     </a:lnL>
@@ -11881,7 +11874,7 @@
                     <a:p>
                       <a:pPr algn="r" fontAlgn="b"/>
                       <a:r>
-                        <a:rPr lang="en-US" sz="1100" b="0" i="0" u="none" strike="noStrike" dirty="0">
+                        <a:rPr lang="en-US" sz="1000" b="0" i="0" u="none" strike="noStrike">
                           <a:solidFill>
                             <a:srgbClr val="000000"/>
                           </a:solidFill>
@@ -11892,7 +11885,7 @@
                       </a:r>
                     </a:p>
                   </a:txBody>
-                  <a:tcPr marL="7481" marR="7481" marT="7481" marB="0" anchor="b">
+                  <a:tcPr marL="6877" marR="6877" marT="6877" marB="0" anchor="b">
                     <a:lnL>
                       <a:noFill/>
                     </a:lnL>
@@ -11914,7 +11907,7 @@
                     <a:p>
                       <a:pPr algn="l" fontAlgn="b"/>
                       <a:r>
-                        <a:rPr lang="en-US" sz="1100" b="0" i="0" u="none" strike="noStrike">
+                        <a:rPr lang="en-US" sz="1000" b="0" i="0" u="none" strike="noStrike">
                           <a:solidFill>
                             <a:srgbClr val="000000"/>
                           </a:solidFill>
@@ -11925,7 +11918,7 @@
                       </a:r>
                     </a:p>
                   </a:txBody>
-                  <a:tcPr marL="7481" marR="7481" marT="7481" marB="0" anchor="b">
+                  <a:tcPr marL="6877" marR="6877" marT="6877" marB="0" anchor="b">
                     <a:lnL>
                       <a:noFill/>
                     </a:lnL>
@@ -11947,7 +11940,7 @@
                     <a:p>
                       <a:pPr algn="r" fontAlgn="b"/>
                       <a:r>
-                        <a:rPr lang="en-US" sz="1100" b="0" i="0" u="none" strike="noStrike">
+                        <a:rPr lang="en-US" sz="1000" b="0" i="0" u="none" strike="noStrike">
                           <a:solidFill>
                             <a:srgbClr val="000000"/>
                           </a:solidFill>
@@ -11958,7 +11951,7 @@
                       </a:r>
                     </a:p>
                   </a:txBody>
-                  <a:tcPr marL="7481" marR="7481" marT="7481" marB="0" anchor="b">
+                  <a:tcPr marL="6877" marR="6877" marT="6877" marB="0" anchor="b">
                     <a:lnL>
                       <a:noFill/>
                     </a:lnL>
@@ -11980,7 +11973,7 @@
                     <a:p>
                       <a:pPr algn="r" fontAlgn="b"/>
                       <a:r>
-                        <a:rPr lang="en-US" sz="1100" b="0" i="0" u="none" strike="noStrike">
+                        <a:rPr lang="en-US" sz="1000" b="0" i="0" u="none" strike="noStrike">
                           <a:solidFill>
                             <a:srgbClr val="000000"/>
                           </a:solidFill>
@@ -11991,7 +11984,7 @@
                       </a:r>
                     </a:p>
                   </a:txBody>
-                  <a:tcPr marL="7481" marR="7481" marT="7481" marB="0" anchor="b">
+                  <a:tcPr marL="6877" marR="6877" marT="6877" marB="0" anchor="b">
                     <a:lnL>
                       <a:noFill/>
                     </a:lnL>
@@ -12013,7 +12006,7 @@
                     <a:p>
                       <a:pPr algn="r" fontAlgn="b"/>
                       <a:r>
-                        <a:rPr lang="en-US" sz="1100" b="0" i="0" u="none" strike="noStrike">
+                        <a:rPr lang="en-US" sz="1000" b="0" i="0" u="none" strike="noStrike">
                           <a:solidFill>
                             <a:srgbClr val="000000"/>
                           </a:solidFill>
@@ -12024,7 +12017,7 @@
                       </a:r>
                     </a:p>
                   </a:txBody>
-                  <a:tcPr marL="7481" marR="7481" marT="7481" marB="0" anchor="b">
+                  <a:tcPr marL="6877" marR="6877" marT="6877" marB="0" anchor="b">
                     <a:lnL>
                       <a:noFill/>
                     </a:lnL>
@@ -12046,7 +12039,7 @@
                     <a:p>
                       <a:pPr algn="r" fontAlgn="b"/>
                       <a:r>
-                        <a:rPr lang="en-US" sz="1100" b="0" i="0" u="none" strike="noStrike">
+                        <a:rPr lang="en-US" sz="1000" b="0" i="0" u="none" strike="noStrike">
                           <a:solidFill>
                             <a:srgbClr val="000000"/>
                           </a:solidFill>
@@ -12057,7 +12050,7 @@
                       </a:r>
                     </a:p>
                   </a:txBody>
-                  <a:tcPr marL="7481" marR="7481" marT="7481" marB="0" anchor="b">
+                  <a:tcPr marL="6877" marR="6877" marT="6877" marB="0" anchor="b">
                     <a:lnL>
                       <a:noFill/>
                     </a:lnL>
@@ -12074,11 +12067,11 @@
                 </a:tc>
                 <a:extLst>
                   <a:ext uri="{0D108BD9-81ED-4DB2-BD59-A6C34878D82A}">
-                    <a16:rowId xmlns:a16="http://schemas.microsoft.com/office/drawing/2014/main" val="2766393121"/>
+                    <a16:rowId xmlns:a16="http://schemas.microsoft.com/office/drawing/2014/main" val="3336877815"/>
                   </a:ext>
                 </a:extLst>
               </a:tr>
-              <a:tr h="179555">
+              <a:tr h="165050">
                 <a:tc>
                   <a:txBody>
                     <a:bodyPr/>
@@ -12086,7 +12079,7 @@
                     <a:p>
                       <a:pPr algn="l" fontAlgn="b"/>
                       <a:r>
-                        <a:rPr lang="en-US" sz="1100" b="0" i="0" u="none" strike="noStrike">
+                        <a:rPr lang="en-US" sz="1000" b="0" i="0" u="none" strike="noStrike">
                           <a:solidFill>
                             <a:srgbClr val="000000"/>
                           </a:solidFill>
@@ -12097,7 +12090,7 @@
                       </a:r>
                     </a:p>
                   </a:txBody>
-                  <a:tcPr marL="7481" marR="7481" marT="7481" marB="0" anchor="b">
+                  <a:tcPr marL="6877" marR="6877" marT="6877" marB="0" anchor="b">
                     <a:lnL>
                       <a:noFill/>
                     </a:lnL>
@@ -12119,7 +12112,7 @@
                     <a:p>
                       <a:pPr algn="l" fontAlgn="b"/>
                       <a:r>
-                        <a:rPr lang="en-US" sz="1100" b="0" i="0" u="none" strike="noStrike">
+                        <a:rPr lang="en-US" sz="1000" b="0" i="0" u="none" strike="noStrike">
                           <a:solidFill>
                             <a:srgbClr val="000000"/>
                           </a:solidFill>
@@ -12130,7 +12123,7 @@
                       </a:r>
                     </a:p>
                   </a:txBody>
-                  <a:tcPr marL="7481" marR="7481" marT="7481" marB="0" anchor="b">
+                  <a:tcPr marL="6877" marR="6877" marT="6877" marB="0" anchor="b">
                     <a:lnL>
                       <a:noFill/>
                     </a:lnL>
@@ -12152,7 +12145,7 @@
                     <a:p>
                       <a:pPr algn="r" fontAlgn="b"/>
                       <a:r>
-                        <a:rPr lang="en-US" sz="1100" b="0" i="0" u="none" strike="noStrike">
+                        <a:rPr lang="en-US" sz="1000" b="0" i="0" u="none" strike="noStrike">
                           <a:solidFill>
                             <a:srgbClr val="000000"/>
                           </a:solidFill>
@@ -12163,7 +12156,7 @@
                       </a:r>
                     </a:p>
                   </a:txBody>
-                  <a:tcPr marL="7481" marR="7481" marT="7481" marB="0" anchor="b">
+                  <a:tcPr marL="6877" marR="6877" marT="6877" marB="0" anchor="b">
                     <a:lnL>
                       <a:noFill/>
                     </a:lnL>
@@ -12185,7 +12178,7 @@
                     <a:p>
                       <a:pPr algn="l" fontAlgn="b"/>
                       <a:r>
-                        <a:rPr lang="en-US" sz="1100" b="0" i="0" u="none" strike="noStrike">
+                        <a:rPr lang="en-US" sz="1000" b="0" i="0" u="none" strike="noStrike">
                           <a:solidFill>
                             <a:srgbClr val="000000"/>
                           </a:solidFill>
@@ -12196,7 +12189,7 @@
                       </a:r>
                     </a:p>
                   </a:txBody>
-                  <a:tcPr marL="7481" marR="7481" marT="7481" marB="0" anchor="b">
+                  <a:tcPr marL="6877" marR="6877" marT="6877" marB="0" anchor="b">
                     <a:lnL>
                       <a:noFill/>
                     </a:lnL>
@@ -12218,7 +12211,7 @@
                     <a:p>
                       <a:pPr algn="r" fontAlgn="b"/>
                       <a:r>
-                        <a:rPr lang="en-US" sz="1100" b="0" i="0" u="none" strike="noStrike">
+                        <a:rPr lang="en-US" sz="1000" b="0" i="0" u="none" strike="noStrike">
                           <a:solidFill>
                             <a:srgbClr val="000000"/>
                           </a:solidFill>
@@ -12229,7 +12222,7 @@
                       </a:r>
                     </a:p>
                   </a:txBody>
-                  <a:tcPr marL="7481" marR="7481" marT="7481" marB="0" anchor="b">
+                  <a:tcPr marL="6877" marR="6877" marT="6877" marB="0" anchor="b">
                     <a:lnL>
                       <a:noFill/>
                     </a:lnL>
@@ -12251,7 +12244,7 @@
                     <a:p>
                       <a:pPr algn="r" fontAlgn="b"/>
                       <a:r>
-                        <a:rPr lang="en-US" sz="1100" b="0" i="0" u="none" strike="noStrike">
+                        <a:rPr lang="en-US" sz="1000" b="0" i="0" u="none" strike="noStrike">
                           <a:solidFill>
                             <a:srgbClr val="000000"/>
                           </a:solidFill>
@@ -12262,7 +12255,7 @@
                       </a:r>
                     </a:p>
                   </a:txBody>
-                  <a:tcPr marL="7481" marR="7481" marT="7481" marB="0" anchor="b">
+                  <a:tcPr marL="6877" marR="6877" marT="6877" marB="0" anchor="b">
                     <a:lnL>
                       <a:noFill/>
                     </a:lnL>
@@ -12284,7 +12277,7 @@
                     <a:p>
                       <a:pPr algn="r" fontAlgn="b"/>
                       <a:r>
-                        <a:rPr lang="en-US" sz="1100" b="0" i="0" u="none" strike="noStrike">
+                        <a:rPr lang="en-US" sz="1000" b="0" i="0" u="none" strike="noStrike">
                           <a:solidFill>
                             <a:srgbClr val="000000"/>
                           </a:solidFill>
@@ -12295,7 +12288,7 @@
                       </a:r>
                     </a:p>
                   </a:txBody>
-                  <a:tcPr marL="7481" marR="7481" marT="7481" marB="0" anchor="b">
+                  <a:tcPr marL="6877" marR="6877" marT="6877" marB="0" anchor="b">
                     <a:lnL>
                       <a:noFill/>
                     </a:lnL>
@@ -12317,7 +12310,7 @@
                     <a:p>
                       <a:pPr algn="r" fontAlgn="b"/>
                       <a:r>
-                        <a:rPr lang="en-US" sz="1100" b="0" i="0" u="none" strike="noStrike">
+                        <a:rPr lang="en-US" sz="1000" b="0" i="0" u="none" strike="noStrike">
                           <a:solidFill>
                             <a:srgbClr val="000000"/>
                           </a:solidFill>
@@ -12328,7 +12321,7 @@
                       </a:r>
                     </a:p>
                   </a:txBody>
-                  <a:tcPr marL="7481" marR="7481" marT="7481" marB="0" anchor="b">
+                  <a:tcPr marL="6877" marR="6877" marT="6877" marB="0" anchor="b">
                     <a:lnL>
                       <a:noFill/>
                     </a:lnL>
@@ -12345,11 +12338,11 @@
                 </a:tc>
                 <a:extLst>
                   <a:ext uri="{0D108BD9-81ED-4DB2-BD59-A6C34878D82A}">
-                    <a16:rowId xmlns:a16="http://schemas.microsoft.com/office/drawing/2014/main" val="3220892165"/>
+                    <a16:rowId xmlns:a16="http://schemas.microsoft.com/office/drawing/2014/main" val="2243944014"/>
                   </a:ext>
                 </a:extLst>
               </a:tr>
-              <a:tr h="179555">
+              <a:tr h="165050">
                 <a:tc>
                   <a:txBody>
                     <a:bodyPr/>
@@ -12357,7 +12350,7 @@
                     <a:p>
                       <a:pPr algn="l" fontAlgn="b"/>
                       <a:r>
-                        <a:rPr lang="en-US" sz="1100" b="0" i="0" u="none" strike="noStrike">
+                        <a:rPr lang="en-US" sz="1000" b="0" i="0" u="none" strike="noStrike">
                           <a:solidFill>
                             <a:srgbClr val="000000"/>
                           </a:solidFill>
@@ -12368,7 +12361,7 @@
                       </a:r>
                     </a:p>
                   </a:txBody>
-                  <a:tcPr marL="7481" marR="7481" marT="7481" marB="0" anchor="b">
+                  <a:tcPr marL="6877" marR="6877" marT="6877" marB="0" anchor="b">
                     <a:lnL>
                       <a:noFill/>
                     </a:lnL>
@@ -12390,7 +12383,7 @@
                     <a:p>
                       <a:pPr algn="l" fontAlgn="b"/>
                       <a:r>
-                        <a:rPr lang="en-US" sz="1100" b="0" i="0" u="none" strike="noStrike">
+                        <a:rPr lang="en-US" sz="1000" b="0" i="0" u="none" strike="noStrike">
                           <a:solidFill>
                             <a:srgbClr val="000000"/>
                           </a:solidFill>
@@ -12401,7 +12394,7 @@
                       </a:r>
                     </a:p>
                   </a:txBody>
-                  <a:tcPr marL="7481" marR="7481" marT="7481" marB="0" anchor="b">
+                  <a:tcPr marL="6877" marR="6877" marT="6877" marB="0" anchor="b">
                     <a:lnL>
                       <a:noFill/>
                     </a:lnL>
@@ -12423,7 +12416,7 @@
                     <a:p>
                       <a:pPr algn="r" fontAlgn="b"/>
                       <a:r>
-                        <a:rPr lang="en-US" sz="1100" b="0" i="0" u="none" strike="noStrike">
+                        <a:rPr lang="en-US" sz="1000" b="0" i="0" u="none" strike="noStrike">
                           <a:solidFill>
                             <a:srgbClr val="000000"/>
                           </a:solidFill>
@@ -12434,7 +12427,7 @@
                       </a:r>
                     </a:p>
                   </a:txBody>
-                  <a:tcPr marL="7481" marR="7481" marT="7481" marB="0" anchor="b">
+                  <a:tcPr marL="6877" marR="6877" marT="6877" marB="0" anchor="b">
                     <a:lnL>
                       <a:noFill/>
                     </a:lnL>
@@ -12456,7 +12449,7 @@
                     <a:p>
                       <a:pPr algn="l" fontAlgn="b"/>
                       <a:r>
-                        <a:rPr lang="en-US" sz="1100" b="0" i="0" u="none" strike="noStrike">
+                        <a:rPr lang="en-US" sz="1000" b="0" i="0" u="none" strike="noStrike">
                           <a:solidFill>
                             <a:srgbClr val="000000"/>
                           </a:solidFill>
@@ -12467,7 +12460,7 @@
                       </a:r>
                     </a:p>
                   </a:txBody>
-                  <a:tcPr marL="7481" marR="7481" marT="7481" marB="0" anchor="b">
+                  <a:tcPr marL="6877" marR="6877" marT="6877" marB="0" anchor="b">
                     <a:lnL>
                       <a:noFill/>
                     </a:lnL>
@@ -12489,7 +12482,7 @@
                     <a:p>
                       <a:pPr algn="r" fontAlgn="b"/>
                       <a:r>
-                        <a:rPr lang="en-US" sz="1100" b="0" i="0" u="none" strike="noStrike">
+                        <a:rPr lang="en-US" sz="1000" b="0" i="0" u="none" strike="noStrike">
                           <a:solidFill>
                             <a:srgbClr val="000000"/>
                           </a:solidFill>
@@ -12500,7 +12493,7 @@
                       </a:r>
                     </a:p>
                   </a:txBody>
-                  <a:tcPr marL="7481" marR="7481" marT="7481" marB="0" anchor="b">
+                  <a:tcPr marL="6877" marR="6877" marT="6877" marB="0" anchor="b">
                     <a:lnL>
                       <a:noFill/>
                     </a:lnL>
@@ -12522,7 +12515,7 @@
                     <a:p>
                       <a:pPr algn="r" fontAlgn="b"/>
                       <a:r>
-                        <a:rPr lang="en-US" sz="1100" b="0" i="0" u="none" strike="noStrike">
+                        <a:rPr lang="en-US" sz="1000" b="0" i="0" u="none" strike="noStrike">
                           <a:solidFill>
                             <a:srgbClr val="000000"/>
                           </a:solidFill>
@@ -12533,7 +12526,7 @@
                       </a:r>
                     </a:p>
                   </a:txBody>
-                  <a:tcPr marL="7481" marR="7481" marT="7481" marB="0" anchor="b">
+                  <a:tcPr marL="6877" marR="6877" marT="6877" marB="0" anchor="b">
                     <a:lnL>
                       <a:noFill/>
                     </a:lnL>
@@ -12555,7 +12548,7 @@
                     <a:p>
                       <a:pPr algn="r" fontAlgn="b"/>
                       <a:r>
-                        <a:rPr lang="en-US" sz="1100" b="0" i="0" u="none" strike="noStrike">
+                        <a:rPr lang="en-US" sz="1000" b="0" i="0" u="none" strike="noStrike">
                           <a:solidFill>
                             <a:srgbClr val="000000"/>
                           </a:solidFill>
@@ -12566,7 +12559,7 @@
                       </a:r>
                     </a:p>
                   </a:txBody>
-                  <a:tcPr marL="7481" marR="7481" marT="7481" marB="0" anchor="b">
+                  <a:tcPr marL="6877" marR="6877" marT="6877" marB="0" anchor="b">
                     <a:lnL>
                       <a:noFill/>
                     </a:lnL>
@@ -12588,7 +12581,7 @@
                     <a:p>
                       <a:pPr algn="r" fontAlgn="b"/>
                       <a:r>
-                        <a:rPr lang="en-US" sz="1100" b="0" i="0" u="none" strike="noStrike" dirty="0">
+                        <a:rPr lang="en-US" sz="1000" b="0" i="0" u="none" strike="noStrike">
                           <a:solidFill>
                             <a:srgbClr val="000000"/>
                           </a:solidFill>
@@ -12599,7 +12592,7 @@
                       </a:r>
                     </a:p>
                   </a:txBody>
-                  <a:tcPr marL="7481" marR="7481" marT="7481" marB="0" anchor="b">
+                  <a:tcPr marL="6877" marR="6877" marT="6877" marB="0" anchor="b">
                     <a:lnL>
                       <a:noFill/>
                     </a:lnL>
@@ -12616,7 +12609,278 @@
                 </a:tc>
                 <a:extLst>
                   <a:ext uri="{0D108BD9-81ED-4DB2-BD59-A6C34878D82A}">
-                    <a16:rowId xmlns:a16="http://schemas.microsoft.com/office/drawing/2014/main" val="1910982281"/>
+                    <a16:rowId xmlns:a16="http://schemas.microsoft.com/office/drawing/2014/main" val="3469428031"/>
+                  </a:ext>
+                </a:extLst>
+              </a:tr>
+              <a:tr h="165050">
+                <a:tc>
+                  <a:txBody>
+                    <a:bodyPr/>
+                    <a:lstStyle/>
+                    <a:p>
+                      <a:pPr algn="l" fontAlgn="b"/>
+                      <a:r>
+                        <a:rPr lang="en-US" sz="1000" b="0" i="0" u="none" strike="noStrike">
+                          <a:solidFill>
+                            <a:srgbClr val="000000"/>
+                          </a:solidFill>
+                          <a:effectLst/>
+                          <a:latin typeface="Calibri" panose="020F0502020204030204" pitchFamily="34" charset="0"/>
+                        </a:rPr>
+                        <a:t>DesignSpecificOutdoorAirFlowPerZoneFloorArea</a:t>
+                      </a:r>
+                    </a:p>
+                  </a:txBody>
+                  <a:tcPr marL="6877" marR="6877" marT="6877" marB="0" anchor="b">
+                    <a:lnL>
+                      <a:noFill/>
+                    </a:lnL>
+                    <a:lnR>
+                      <a:noFill/>
+                    </a:lnR>
+                    <a:lnT>
+                      <a:noFill/>
+                    </a:lnT>
+                    <a:lnB>
+                      <a:noFill/>
+                    </a:lnB>
+                  </a:tcPr>
+                </a:tc>
+                <a:tc>
+                  <a:txBody>
+                    <a:bodyPr/>
+                    <a:lstStyle/>
+                    <a:p>
+                      <a:pPr algn="l" fontAlgn="b"/>
+                      <a:r>
+                        <a:rPr lang="en-US" sz="1000" b="0" i="0" u="none" strike="noStrike">
+                          <a:solidFill>
+                            <a:srgbClr val="000000"/>
+                          </a:solidFill>
+                          <a:effectLst/>
+                          <a:latin typeface="Calibri" panose="020F0502020204030204" pitchFamily="34" charset="0"/>
+                        </a:rPr>
+                        <a:t>Office_Outdoor_Air</a:t>
+                      </a:r>
+                    </a:p>
+                  </a:txBody>
+                  <a:tcPr marL="6877" marR="6877" marT="6877" marB="0" anchor="b">
+                    <a:lnL>
+                      <a:noFill/>
+                    </a:lnL>
+                    <a:lnR>
+                      <a:noFill/>
+                    </a:lnR>
+                    <a:lnT>
+                      <a:noFill/>
+                    </a:lnT>
+                    <a:lnB>
+                      <a:noFill/>
+                    </a:lnB>
+                  </a:tcPr>
+                </a:tc>
+                <a:tc>
+                  <a:txBody>
+                    <a:bodyPr/>
+                    <a:lstStyle/>
+                    <a:p>
+                      <a:pPr algn="r" fontAlgn="b"/>
+                      <a:r>
+                        <a:rPr lang="en-US" sz="1000" b="0" i="0" u="none" strike="noStrike">
+                          <a:solidFill>
+                            <a:srgbClr val="000000"/>
+                          </a:solidFill>
+                          <a:effectLst/>
+                          <a:latin typeface="Calibri" panose="020F0502020204030204" pitchFamily="34" charset="0"/>
+                        </a:rPr>
+                        <a:t>0.0004318</a:t>
+                      </a:r>
+                    </a:p>
+                  </a:txBody>
+                  <a:tcPr marL="6877" marR="6877" marT="6877" marB="0" anchor="b">
+                    <a:lnL>
+                      <a:noFill/>
+                    </a:lnL>
+                    <a:lnR>
+                      <a:noFill/>
+                    </a:lnR>
+                    <a:lnT>
+                      <a:noFill/>
+                    </a:lnT>
+                    <a:lnB>
+                      <a:noFill/>
+                    </a:lnB>
+                  </a:tcPr>
+                </a:tc>
+                <a:tc>
+                  <a:txBody>
+                    <a:bodyPr/>
+                    <a:lstStyle/>
+                    <a:p>
+                      <a:pPr algn="l" fontAlgn="b"/>
+                      <a:r>
+                        <a:rPr lang="en-US" sz="1000" b="0" i="0" u="none" strike="noStrike">
+                          <a:solidFill>
+                            <a:srgbClr val="000000"/>
+                          </a:solidFill>
+                          <a:effectLst/>
+                          <a:latin typeface="Calibri" panose="020F0502020204030204" pitchFamily="34" charset="0"/>
+                        </a:rPr>
+                        <a:t>Normal Relative</a:t>
+                      </a:r>
+                    </a:p>
+                  </a:txBody>
+                  <a:tcPr marL="6877" marR="6877" marT="6877" marB="0" anchor="b">
+                    <a:lnL>
+                      <a:noFill/>
+                    </a:lnL>
+                    <a:lnR>
+                      <a:noFill/>
+                    </a:lnR>
+                    <a:lnT>
+                      <a:noFill/>
+                    </a:lnT>
+                    <a:lnB>
+                      <a:noFill/>
+                    </a:lnB>
+                  </a:tcPr>
+                </a:tc>
+                <a:tc>
+                  <a:txBody>
+                    <a:bodyPr/>
+                    <a:lstStyle/>
+                    <a:p>
+                      <a:pPr algn="r" fontAlgn="b"/>
+                      <a:r>
+                        <a:rPr lang="en-US" sz="1000" b="0" i="0" u="none" strike="noStrike">
+                          <a:solidFill>
+                            <a:srgbClr val="000000"/>
+                          </a:solidFill>
+                          <a:effectLst/>
+                          <a:latin typeface="Calibri" panose="020F0502020204030204" pitchFamily="34" charset="0"/>
+                        </a:rPr>
+                        <a:t>1</a:t>
+                      </a:r>
+                    </a:p>
+                  </a:txBody>
+                  <a:tcPr marL="6877" marR="6877" marT="6877" marB="0" anchor="b">
+                    <a:lnL>
+                      <a:noFill/>
+                    </a:lnL>
+                    <a:lnR>
+                      <a:noFill/>
+                    </a:lnR>
+                    <a:lnT>
+                      <a:noFill/>
+                    </a:lnT>
+                    <a:lnB>
+                      <a:noFill/>
+                    </a:lnB>
+                  </a:tcPr>
+                </a:tc>
+                <a:tc>
+                  <a:txBody>
+                    <a:bodyPr/>
+                    <a:lstStyle/>
+                    <a:p>
+                      <a:pPr algn="r" fontAlgn="b"/>
+                      <a:r>
+                        <a:rPr lang="en-US" sz="1000" b="0" i="0" u="none" strike="noStrike">
+                          <a:solidFill>
+                            <a:srgbClr val="000000"/>
+                          </a:solidFill>
+                          <a:effectLst/>
+                          <a:latin typeface="Calibri" panose="020F0502020204030204" pitchFamily="34" charset="0"/>
+                        </a:rPr>
+                        <a:t>0.01</a:t>
+                      </a:r>
+                    </a:p>
+                  </a:txBody>
+                  <a:tcPr marL="6877" marR="6877" marT="6877" marB="0" anchor="b">
+                    <a:lnL>
+                      <a:noFill/>
+                    </a:lnL>
+                    <a:lnR>
+                      <a:noFill/>
+                    </a:lnR>
+                    <a:lnT>
+                      <a:noFill/>
+                    </a:lnT>
+                    <a:lnB>
+                      <a:noFill/>
+                    </a:lnB>
+                  </a:tcPr>
+                </a:tc>
+                <a:tc>
+                  <a:txBody>
+                    <a:bodyPr/>
+                    <a:lstStyle/>
+                    <a:p>
+                      <a:pPr algn="r" fontAlgn="b"/>
+                      <a:r>
+                        <a:rPr lang="en-US" sz="1000" b="0" i="0" u="none" strike="noStrike">
+                          <a:solidFill>
+                            <a:srgbClr val="000000"/>
+                          </a:solidFill>
+                          <a:effectLst/>
+                          <a:latin typeface="Calibri" panose="020F0502020204030204" pitchFamily="34" charset="0"/>
+                        </a:rPr>
+                        <a:t>0</a:t>
+                      </a:r>
+                    </a:p>
+                  </a:txBody>
+                  <a:tcPr marL="6877" marR="6877" marT="6877" marB="0" anchor="b">
+                    <a:lnL>
+                      <a:noFill/>
+                    </a:lnL>
+                    <a:lnR>
+                      <a:noFill/>
+                    </a:lnR>
+                    <a:lnT>
+                      <a:noFill/>
+                    </a:lnT>
+                    <a:lnB>
+                      <a:noFill/>
+                    </a:lnB>
+                  </a:tcPr>
+                </a:tc>
+                <a:tc>
+                  <a:txBody>
+                    <a:bodyPr/>
+                    <a:lstStyle/>
+                    <a:p>
+                      <a:pPr algn="r" fontAlgn="b"/>
+                      <a:r>
+                        <a:rPr lang="en-US" sz="1000" b="0" i="0" u="none" strike="noStrike" dirty="0">
+                          <a:solidFill>
+                            <a:srgbClr val="000000"/>
+                          </a:solidFill>
+                          <a:effectLst/>
+                          <a:latin typeface="Calibri" panose="020F0502020204030204" pitchFamily="34" charset="0"/>
+                        </a:rPr>
+                        <a:t>NA</a:t>
+                      </a:r>
+                    </a:p>
+                  </a:txBody>
+                  <a:tcPr marL="6877" marR="6877" marT="6877" marB="0" anchor="b">
+                    <a:lnL>
+                      <a:noFill/>
+                    </a:lnL>
+                    <a:lnR>
+                      <a:noFill/>
+                    </a:lnR>
+                    <a:lnT>
+                      <a:noFill/>
+                    </a:lnT>
+                    <a:lnB>
+                      <a:noFill/>
+                    </a:lnB>
+                  </a:tcPr>
+                </a:tc>
+                <a:extLst>
+                  <a:ext uri="{0D108BD9-81ED-4DB2-BD59-A6C34878D82A}">
+                    <a16:rowId xmlns:a16="http://schemas.microsoft.com/office/drawing/2014/main" val="2294512254"/>
                   </a:ext>
                 </a:extLst>
               </a:tr>
@@ -13214,10 +13478,10 @@
       </p:sp>
       <p:graphicFrame>
         <p:nvGraphicFramePr>
-          <p:cNvPr id="5" name="Table 4">
+          <p:cNvPr id="4" name="Table 3">
             <a:extLst>
               <a:ext uri="{FF2B5EF4-FFF2-40B4-BE49-F238E27FC236}">
-                <a16:creationId xmlns:a16="http://schemas.microsoft.com/office/drawing/2014/main" id="{34CCD12C-1F5A-4470-A862-882DCE100E34}"/>
+                <a16:creationId xmlns:a16="http://schemas.microsoft.com/office/drawing/2014/main" id="{081B29A9-2DF3-4246-8068-0EEB3236302C}"/>
               </a:ext>
             </a:extLst>
           </p:cNvPr>
@@ -13227,14 +13491,14 @@
           <p:nvPr>
             <p:extLst>
               <p:ext uri="{D42A27DB-BD31-4B8C-83A1-F6EECF244321}">
-                <p14:modId xmlns:p14="http://schemas.microsoft.com/office/powerpoint/2010/main" val="4006584470"/>
+                <p14:modId xmlns:p14="http://schemas.microsoft.com/office/powerpoint/2010/main" val="1349053599"/>
               </p:ext>
             </p:extLst>
           </p:nvPr>
         </p:nvGraphicFramePr>
         <p:xfrm>
-          <a:off x="1758949" y="4503889"/>
-          <a:ext cx="5626100" cy="914400"/>
+          <a:off x="1758949" y="2343372"/>
+          <a:ext cx="5626100" cy="1097280"/>
         </p:xfrm>
         <a:graphic>
           <a:graphicData uri="http://schemas.openxmlformats.org/drawingml/2006/table">
@@ -13244,28 +13508,28 @@
                 <a:gridCol w="3797300">
                   <a:extLst>
                     <a:ext uri="{9D8B030D-6E8A-4147-A177-3AD203B41FA5}">
-                      <a16:colId xmlns:a16="http://schemas.microsoft.com/office/drawing/2014/main" val="1786374183"/>
+                      <a16:colId xmlns:a16="http://schemas.microsoft.com/office/drawing/2014/main" val="1921129663"/>
                     </a:ext>
                   </a:extLst>
                 </a:gridCol>
                 <a:gridCol w="609600">
                   <a:extLst>
                     <a:ext uri="{9D8B030D-6E8A-4147-A177-3AD203B41FA5}">
-                      <a16:colId xmlns:a16="http://schemas.microsoft.com/office/drawing/2014/main" val="2255257931"/>
+                      <a16:colId xmlns:a16="http://schemas.microsoft.com/office/drawing/2014/main" val="1887955086"/>
                     </a:ext>
                   </a:extLst>
                 </a:gridCol>
                 <a:gridCol w="609600">
                   <a:extLst>
                     <a:ext uri="{9D8B030D-6E8A-4147-A177-3AD203B41FA5}">
-                      <a16:colId xmlns:a16="http://schemas.microsoft.com/office/drawing/2014/main" val="3200875507"/>
+                      <a16:colId xmlns:a16="http://schemas.microsoft.com/office/drawing/2014/main" val="771498831"/>
                     </a:ext>
                   </a:extLst>
                 </a:gridCol>
                 <a:gridCol w="609600">
                   <a:extLst>
                     <a:ext uri="{9D8B030D-6E8A-4147-A177-3AD203B41FA5}">
-                      <a16:colId xmlns:a16="http://schemas.microsoft.com/office/drawing/2014/main" val="2834548634"/>
+                      <a16:colId xmlns:a16="http://schemas.microsoft.com/office/drawing/2014/main" val="341762153"/>
                     </a:ext>
                   </a:extLst>
                 </a:gridCol>
@@ -13402,7 +13666,7 @@
                 </a:tc>
                 <a:extLst>
                   <a:ext uri="{0D108BD9-81ED-4DB2-BD59-A6C34878D82A}">
-                    <a16:rowId xmlns:a16="http://schemas.microsoft.com/office/drawing/2014/main" val="3614519127"/>
+                    <a16:rowId xmlns:a16="http://schemas.microsoft.com/office/drawing/2014/main" val="2665895072"/>
                   </a:ext>
                 </a:extLst>
               </a:tr>
@@ -13454,7 +13718,7 @@
                           <a:effectLst/>
                           <a:latin typeface="Calibri" panose="020F0502020204030204" pitchFamily="34" charset="0"/>
                         </a:rPr>
-                        <a:t>0.060978</a:t>
+                        <a:t>-389.818</a:t>
                       </a:r>
                     </a:p>
                   </a:txBody>
@@ -13487,7 +13751,7 @@
                           <a:effectLst/>
                           <a:latin typeface="Calibri" panose="020F0502020204030204" pitchFamily="34" charset="0"/>
                         </a:rPr>
-                        <a:t>0.104533</a:t>
+                        <a:t>932.3372</a:t>
                       </a:r>
                     </a:p>
                   </a:txBody>
@@ -13520,7 +13784,7 @@
                           <a:effectLst/>
                           <a:latin typeface="Calibri" panose="020F0502020204030204" pitchFamily="34" charset="0"/>
                         </a:rPr>
-                        <a:t>0.169671</a:t>
+                        <a:t>1395.541</a:t>
                       </a:r>
                     </a:p>
                   </a:txBody>
@@ -13541,7 +13805,7 @@
                 </a:tc>
                 <a:extLst>
                   <a:ext uri="{0D108BD9-81ED-4DB2-BD59-A6C34878D82A}">
-                    <a16:rowId xmlns:a16="http://schemas.microsoft.com/office/drawing/2014/main" val="2610198420"/>
+                    <a16:rowId xmlns:a16="http://schemas.microsoft.com/office/drawing/2014/main" val="2626566225"/>
                   </a:ext>
                 </a:extLst>
               </a:tr>
@@ -13593,7 +13857,7 @@
                           <a:effectLst/>
                           <a:latin typeface="Calibri" panose="020F0502020204030204" pitchFamily="34" charset="0"/>
                         </a:rPr>
-                        <a:t>-0.03484</a:t>
+                        <a:t>-1216.62</a:t>
                       </a:r>
                     </a:p>
                   </a:txBody>
@@ -13626,7 +13890,7 @@
                           <a:effectLst/>
                           <a:latin typeface="Calibri" panose="020F0502020204030204" pitchFamily="34" charset="0"/>
                         </a:rPr>
-                        <a:t>0.052267</a:t>
+                        <a:t>1216.616</a:t>
                       </a:r>
                     </a:p>
                   </a:txBody>
@@ -13659,7 +13923,7 @@
                           <a:effectLst/>
                           <a:latin typeface="Calibri" panose="020F0502020204030204" pitchFamily="34" charset="0"/>
                         </a:rPr>
-                        <a:t>0.076378</a:t>
+                        <a:t>817.0287</a:t>
                       </a:r>
                     </a:p>
                   </a:txBody>
@@ -13680,7 +13944,7 @@
                 </a:tc>
                 <a:extLst>
                   <a:ext uri="{0D108BD9-81ED-4DB2-BD59-A6C34878D82A}">
-                    <a16:rowId xmlns:a16="http://schemas.microsoft.com/office/drawing/2014/main" val="78458615"/>
+                    <a16:rowId xmlns:a16="http://schemas.microsoft.com/office/drawing/2014/main" val="2562766130"/>
                   </a:ext>
                 </a:extLst>
               </a:tr>
@@ -13732,7 +13996,7 @@
                           <a:effectLst/>
                           <a:latin typeface="Calibri" panose="020F0502020204030204" pitchFamily="34" charset="0"/>
                         </a:rPr>
-                        <a:t>-0.0392</a:t>
+                        <a:t>-430.791</a:t>
                       </a:r>
                     </a:p>
                   </a:txBody>
@@ -13765,7 +14029,7 @@
                           <a:effectLst/>
                           <a:latin typeface="Calibri" panose="020F0502020204030204" pitchFamily="34" charset="0"/>
                         </a:rPr>
-                        <a:t>0.1176</a:t>
+                        <a:t>1829.638</a:t>
                       </a:r>
                     </a:p>
                   </a:txBody>
@@ -13798,7 +14062,7 @@
                           <a:effectLst/>
                           <a:latin typeface="Calibri" panose="020F0502020204030204" pitchFamily="34" charset="0"/>
                         </a:rPr>
-                        <a:t>0.148824</a:t>
+                        <a:t>2739.633</a:t>
                       </a:r>
                     </a:p>
                   </a:txBody>
@@ -13819,7 +14083,7 @@
                 </a:tc>
                 <a:extLst>
                   <a:ext uri="{0D108BD9-81ED-4DB2-BD59-A6C34878D82A}">
-                    <a16:rowId xmlns:a16="http://schemas.microsoft.com/office/drawing/2014/main" val="816982887"/>
+                    <a16:rowId xmlns:a16="http://schemas.microsoft.com/office/drawing/2014/main" val="2737873297"/>
                   </a:ext>
                 </a:extLst>
               </a:tr>
@@ -13871,7 +14135,7 @@
                           <a:effectLst/>
                           <a:latin typeface="Calibri" panose="020F0502020204030204" pitchFamily="34" charset="0"/>
                         </a:rPr>
-                        <a:t>0.021778</a:t>
+                        <a:t>-102.665</a:t>
                       </a:r>
                     </a:p>
                   </a:txBody>
@@ -13904,7 +14168,146 @@
                           <a:effectLst/>
                           <a:latin typeface="Calibri" panose="020F0502020204030204" pitchFamily="34" charset="0"/>
                         </a:rPr>
-                        <a:t>0.108889</a:t>
+                        <a:t>589.2675</a:t>
+                      </a:r>
+                    </a:p>
+                  </a:txBody>
+                  <a:tcPr marL="7620" marR="7620" marT="7620" marB="0" anchor="b">
+                    <a:lnL>
+                      <a:noFill/>
+                    </a:lnL>
+                    <a:lnR>
+                      <a:noFill/>
+                    </a:lnR>
+                    <a:lnT>
+                      <a:noFill/>
+                    </a:lnT>
+                    <a:lnB>
+                      <a:noFill/>
+                    </a:lnB>
+                  </a:tcPr>
+                </a:tc>
+                <a:tc>
+                  <a:txBody>
+                    <a:bodyPr/>
+                    <a:lstStyle/>
+                    <a:p>
+                      <a:pPr algn="r" fontAlgn="b"/>
+                      <a:r>
+                        <a:rPr lang="en-US" sz="1100" b="0" i="0" u="none" strike="noStrike">
+                          <a:solidFill>
+                            <a:srgbClr val="000000"/>
+                          </a:solidFill>
+                          <a:effectLst/>
+                          <a:latin typeface="Calibri" panose="020F0502020204030204" pitchFamily="34" charset="0"/>
+                        </a:rPr>
+                        <a:t>960.778</a:t>
+                      </a:r>
+                    </a:p>
+                  </a:txBody>
+                  <a:tcPr marL="7620" marR="7620" marT="7620" marB="0" anchor="b">
+                    <a:lnL>
+                      <a:noFill/>
+                    </a:lnL>
+                    <a:lnR>
+                      <a:noFill/>
+                    </a:lnR>
+                    <a:lnT>
+                      <a:noFill/>
+                    </a:lnT>
+                    <a:lnB>
+                      <a:noFill/>
+                    </a:lnB>
+                  </a:tcPr>
+                </a:tc>
+                <a:extLst>
+                  <a:ext uri="{0D108BD9-81ED-4DB2-BD59-A6C34878D82A}">
+                    <a16:rowId xmlns:a16="http://schemas.microsoft.com/office/drawing/2014/main" val="489446238"/>
+                  </a:ext>
+                </a:extLst>
+              </a:tr>
+              <a:tr h="182880">
+                <a:tc>
+                  <a:txBody>
+                    <a:bodyPr/>
+                    <a:lstStyle/>
+                    <a:p>
+                      <a:pPr algn="l" fontAlgn="b"/>
+                      <a:r>
+                        <a:rPr lang="en-US" sz="1100" b="0" i="0" u="none" strike="noStrike">
+                          <a:solidFill>
+                            <a:srgbClr val="000000"/>
+                          </a:solidFill>
+                          <a:effectLst/>
+                          <a:latin typeface="Calibri" panose="020F0502020204030204" pitchFamily="34" charset="0"/>
+                        </a:rPr>
+                        <a:t>DesignSpecificOutdoorAirFlowPerZoneFloorArea: Office_Outdoor</a:t>
+                      </a:r>
+                    </a:p>
+                  </a:txBody>
+                  <a:tcPr marL="7620" marR="7620" marT="7620" marB="0" anchor="b">
+                    <a:lnL>
+                      <a:noFill/>
+                    </a:lnL>
+                    <a:lnR>
+                      <a:noFill/>
+                    </a:lnR>
+                    <a:lnT>
+                      <a:noFill/>
+                    </a:lnT>
+                    <a:lnB>
+                      <a:noFill/>
+                    </a:lnB>
+                  </a:tcPr>
+                </a:tc>
+                <a:tc>
+                  <a:txBody>
+                    <a:bodyPr/>
+                    <a:lstStyle/>
+                    <a:p>
+                      <a:pPr algn="r" fontAlgn="b"/>
+                      <a:r>
+                        <a:rPr lang="en-US" sz="1100" b="0" i="0" u="none" strike="noStrike">
+                          <a:solidFill>
+                            <a:srgbClr val="000000"/>
+                          </a:solidFill>
+                          <a:effectLst/>
+                          <a:latin typeface="Calibri" panose="020F0502020204030204" pitchFamily="34" charset="0"/>
+                        </a:rPr>
+                        <a:t>-735.549</a:t>
+                      </a:r>
+                    </a:p>
+                  </a:txBody>
+                  <a:tcPr marL="7620" marR="7620" marT="7620" marB="0" anchor="b">
+                    <a:lnL>
+                      <a:noFill/>
+                    </a:lnL>
+                    <a:lnR>
+                      <a:noFill/>
+                    </a:lnR>
+                    <a:lnT>
+                      <a:noFill/>
+                    </a:lnT>
+                    <a:lnB>
+                      <a:noFill/>
+                    </a:lnB>
+                  </a:tcPr>
+                </a:tc>
+                <a:tc>
+                  <a:txBody>
+                    <a:bodyPr/>
+                    <a:lstStyle/>
+                    <a:p>
+                      <a:pPr algn="r" fontAlgn="b"/>
+                      <a:r>
+                        <a:rPr lang="en-US" sz="1100" b="0" i="0" u="none" strike="noStrike">
+                          <a:solidFill>
+                            <a:srgbClr val="000000"/>
+                          </a:solidFill>
+                          <a:effectLst/>
+                          <a:latin typeface="Calibri" panose="020F0502020204030204" pitchFamily="34" charset="0"/>
+                        </a:rPr>
+                        <a:t>1405.033</a:t>
                       </a:r>
                     </a:p>
                   </a:txBody>
@@ -13937,7 +14340,7 @@
                           <a:effectLst/>
                           <a:latin typeface="Calibri" panose="020F0502020204030204" pitchFamily="34" charset="0"/>
                         </a:rPr>
-                        <a:t>0.155524</a:t>
+                        <a:t>1493.021</a:t>
                       </a:r>
                     </a:p>
                   </a:txBody>
@@ -13958,7 +14361,7 @@
                 </a:tc>
                 <a:extLst>
                   <a:ext uri="{0D108BD9-81ED-4DB2-BD59-A6C34878D82A}">
-                    <a16:rowId xmlns:a16="http://schemas.microsoft.com/office/drawing/2014/main" val="294404133"/>
+                    <a16:rowId xmlns:a16="http://schemas.microsoft.com/office/drawing/2014/main" val="2086495563"/>
                   </a:ext>
                 </a:extLst>
               </a:tr>
@@ -13968,10 +14371,10 @@
       </p:graphicFrame>
       <p:graphicFrame>
         <p:nvGraphicFramePr>
-          <p:cNvPr id="8" name="Table 7">
+          <p:cNvPr id="9" name="Table 8">
             <a:extLst>
               <a:ext uri="{FF2B5EF4-FFF2-40B4-BE49-F238E27FC236}">
-                <a16:creationId xmlns:a16="http://schemas.microsoft.com/office/drawing/2014/main" id="{76B24213-A15E-41B7-A20B-4C13DDE80326}"/>
+                <a16:creationId xmlns:a16="http://schemas.microsoft.com/office/drawing/2014/main" id="{E12EB3FA-7A0A-43B2-8614-2D4772DAFEBA}"/>
               </a:ext>
             </a:extLst>
           </p:cNvPr>
@@ -13981,14 +14384,14 @@
           <p:nvPr>
             <p:extLst>
               <p:ext uri="{D42A27DB-BD31-4B8C-83A1-F6EECF244321}">
-                <p14:modId xmlns:p14="http://schemas.microsoft.com/office/powerpoint/2010/main" val="1378220194"/>
+                <p14:modId xmlns:p14="http://schemas.microsoft.com/office/powerpoint/2010/main" val="1339204738"/>
               </p:ext>
             </p:extLst>
           </p:nvPr>
         </p:nvGraphicFramePr>
         <p:xfrm>
-          <a:off x="1758949" y="2474717"/>
-          <a:ext cx="5626100" cy="914400"/>
+          <a:off x="1758949" y="4343400"/>
+          <a:ext cx="5626100" cy="1097280"/>
         </p:xfrm>
         <a:graphic>
           <a:graphicData uri="http://schemas.openxmlformats.org/drawingml/2006/table">
@@ -13998,28 +14401,28 @@
                 <a:gridCol w="3797300">
                   <a:extLst>
                     <a:ext uri="{9D8B030D-6E8A-4147-A177-3AD203B41FA5}">
-                      <a16:colId xmlns:a16="http://schemas.microsoft.com/office/drawing/2014/main" val="4123131133"/>
+                      <a16:colId xmlns:a16="http://schemas.microsoft.com/office/drawing/2014/main" val="2976065303"/>
                     </a:ext>
                   </a:extLst>
                 </a:gridCol>
                 <a:gridCol w="609600">
                   <a:extLst>
                     <a:ext uri="{9D8B030D-6E8A-4147-A177-3AD203B41FA5}">
-                      <a16:colId xmlns:a16="http://schemas.microsoft.com/office/drawing/2014/main" val="2435586051"/>
+                      <a16:colId xmlns:a16="http://schemas.microsoft.com/office/drawing/2014/main" val="3633034693"/>
                     </a:ext>
                   </a:extLst>
                 </a:gridCol>
                 <a:gridCol w="609600">
                   <a:extLst>
                     <a:ext uri="{9D8B030D-6E8A-4147-A177-3AD203B41FA5}">
-                      <a16:colId xmlns:a16="http://schemas.microsoft.com/office/drawing/2014/main" val="3022393306"/>
+                      <a16:colId xmlns:a16="http://schemas.microsoft.com/office/drawing/2014/main" val="107961649"/>
                     </a:ext>
                   </a:extLst>
                 </a:gridCol>
                 <a:gridCol w="609600">
                   <a:extLst>
                     <a:ext uri="{9D8B030D-6E8A-4147-A177-3AD203B41FA5}">
-                      <a16:colId xmlns:a16="http://schemas.microsoft.com/office/drawing/2014/main" val="2705301330"/>
+                      <a16:colId xmlns:a16="http://schemas.microsoft.com/office/drawing/2014/main" val="459008776"/>
                     </a:ext>
                   </a:extLst>
                 </a:gridCol>
@@ -14156,7 +14559,7 @@
                 </a:tc>
                 <a:extLst>
                   <a:ext uri="{0D108BD9-81ED-4DB2-BD59-A6C34878D82A}">
-                    <a16:rowId xmlns:a16="http://schemas.microsoft.com/office/drawing/2014/main" val="2311105068"/>
+                    <a16:rowId xmlns:a16="http://schemas.microsoft.com/office/drawing/2014/main" val="4020403361"/>
                   </a:ext>
                 </a:extLst>
               </a:tr>
@@ -14208,7 +14611,7 @@
                           <a:effectLst/>
                           <a:latin typeface="Calibri" panose="020F0502020204030204" pitchFamily="34" charset="0"/>
                         </a:rPr>
-                        <a:t>-338.422</a:t>
+                        <a:t>-0.05227</a:t>
                       </a:r>
                     </a:p>
                   </a:txBody>
@@ -14241,7 +14644,7 @@
                           <a:effectLst/>
                           <a:latin typeface="Calibri" panose="020F0502020204030204" pitchFamily="34" charset="0"/>
                         </a:rPr>
-                        <a:t>1263.969</a:t>
+                        <a:t>0.0784</a:t>
                       </a:r>
                     </a:p>
                   </a:txBody>
@@ -14274,7 +14677,7 @@
                           <a:effectLst/>
                           <a:latin typeface="Calibri" panose="020F0502020204030204" pitchFamily="34" charset="0"/>
                         </a:rPr>
-                        <a:t>1788.232</a:t>
+                        <a:t>0.115853</a:t>
                       </a:r>
                     </a:p>
                   </a:txBody>
@@ -14295,7 +14698,7 @@
                 </a:tc>
                 <a:extLst>
                   <a:ext uri="{0D108BD9-81ED-4DB2-BD59-A6C34878D82A}">
-                    <a16:rowId xmlns:a16="http://schemas.microsoft.com/office/drawing/2014/main" val="1785296883"/>
+                    <a16:rowId xmlns:a16="http://schemas.microsoft.com/office/drawing/2014/main" val="2222201163"/>
                   </a:ext>
                 </a:extLst>
               </a:tr>
@@ -14347,7 +14750,7 @@
                           <a:effectLst/>
                           <a:latin typeface="Calibri" panose="020F0502020204030204" pitchFamily="34" charset="0"/>
                         </a:rPr>
-                        <a:t>728.0355</a:t>
+                        <a:t>0.021778</a:t>
                       </a:r>
                     </a:p>
                   </a:txBody>
@@ -14380,7 +14783,7 @@
                           <a:effectLst/>
                           <a:latin typeface="Calibri" panose="020F0502020204030204" pitchFamily="34" charset="0"/>
                         </a:rPr>
-                        <a:t>1367.579</a:t>
+                        <a:t>0.108889</a:t>
                       </a:r>
                     </a:p>
                   </a:txBody>
@@ -14413,7 +14816,7 @@
                           <a:effectLst/>
                           <a:latin typeface="Calibri" panose="020F0502020204030204" pitchFamily="34" charset="0"/>
                         </a:rPr>
-                        <a:t>1796.105</a:t>
+                        <a:t>0.141974</a:t>
                       </a:r>
                     </a:p>
                   </a:txBody>
@@ -14434,7 +14837,7 @@
                 </a:tc>
                 <a:extLst>
                   <a:ext uri="{0D108BD9-81ED-4DB2-BD59-A6C34878D82A}">
-                    <a16:rowId xmlns:a16="http://schemas.microsoft.com/office/drawing/2014/main" val="481176233"/>
+                    <a16:rowId xmlns:a16="http://schemas.microsoft.com/office/drawing/2014/main" val="421232786"/>
                   </a:ext>
                 </a:extLst>
               </a:tr>
@@ -14486,7 +14889,7 @@
                           <a:effectLst/>
                           <a:latin typeface="Calibri" panose="020F0502020204030204" pitchFamily="34" charset="0"/>
                         </a:rPr>
-                        <a:t>-585.173</a:t>
+                        <a:t>0.113244</a:t>
                       </a:r>
                     </a:p>
                   </a:txBody>
@@ -14519,7 +14922,7 @@
                           <a:effectLst/>
                           <a:latin typeface="Calibri" panose="020F0502020204030204" pitchFamily="34" charset="0"/>
                         </a:rPr>
-                        <a:t>1401.57</a:t>
+                        <a:t>0.296178</a:t>
                       </a:r>
                     </a:p>
                   </a:txBody>
@@ -14552,7 +14955,7 @@
                           <a:effectLst/>
                           <a:latin typeface="Calibri" panose="020F0502020204030204" pitchFamily="34" charset="0"/>
                         </a:rPr>
-                        <a:t>1733.672</a:t>
+                        <a:t>0.351629</a:t>
                       </a:r>
                     </a:p>
                   </a:txBody>
@@ -14573,7 +14976,7 @@
                 </a:tc>
                 <a:extLst>
                   <a:ext uri="{0D108BD9-81ED-4DB2-BD59-A6C34878D82A}">
-                    <a16:rowId xmlns:a16="http://schemas.microsoft.com/office/drawing/2014/main" val="910420498"/>
+                    <a16:rowId xmlns:a16="http://schemas.microsoft.com/office/drawing/2014/main" val="3485108305"/>
                   </a:ext>
                 </a:extLst>
               </a:tr>
@@ -14625,7 +15028,7 @@
                           <a:effectLst/>
                           <a:latin typeface="Calibri" panose="020F0502020204030204" pitchFamily="34" charset="0"/>
                         </a:rPr>
-                        <a:t>-265.946</a:t>
+                        <a:t>0.113244</a:t>
                       </a:r>
                     </a:p>
                   </a:txBody>
@@ -14658,7 +15061,146 @@
                           <a:effectLst/>
                           <a:latin typeface="Calibri" panose="020F0502020204030204" pitchFamily="34" charset="0"/>
                         </a:rPr>
-                        <a:t>1675.456</a:t>
+                        <a:t>0.121956</a:t>
+                      </a:r>
+                    </a:p>
+                  </a:txBody>
+                  <a:tcPr marL="7620" marR="7620" marT="7620" marB="0" anchor="b">
+                    <a:lnL>
+                      <a:noFill/>
+                    </a:lnL>
+                    <a:lnR>
+                      <a:noFill/>
+                    </a:lnR>
+                    <a:lnT>
+                      <a:noFill/>
+                    </a:lnT>
+                    <a:lnB>
+                      <a:noFill/>
+                    </a:lnB>
+                  </a:tcPr>
+                </a:tc>
+                <a:tc>
+                  <a:txBody>
+                    <a:bodyPr/>
+                    <a:lstStyle/>
+                    <a:p>
+                      <a:pPr algn="r" fontAlgn="b"/>
+                      <a:r>
+                        <a:rPr lang="en-US" sz="1100" b="0" i="0" u="none" strike="noStrike">
+                          <a:solidFill>
+                            <a:srgbClr val="000000"/>
+                          </a:solidFill>
+                          <a:effectLst/>
+                          <a:latin typeface="Calibri" panose="020F0502020204030204" pitchFamily="34" charset="0"/>
+                        </a:rPr>
+                        <a:t>0.125482</a:t>
+                      </a:r>
+                    </a:p>
+                  </a:txBody>
+                  <a:tcPr marL="7620" marR="7620" marT="7620" marB="0" anchor="b">
+                    <a:lnL>
+                      <a:noFill/>
+                    </a:lnL>
+                    <a:lnR>
+                      <a:noFill/>
+                    </a:lnR>
+                    <a:lnT>
+                      <a:noFill/>
+                    </a:lnT>
+                    <a:lnB>
+                      <a:noFill/>
+                    </a:lnB>
+                  </a:tcPr>
+                </a:tc>
+                <a:extLst>
+                  <a:ext uri="{0D108BD9-81ED-4DB2-BD59-A6C34878D82A}">
+                    <a16:rowId xmlns:a16="http://schemas.microsoft.com/office/drawing/2014/main" val="2173552038"/>
+                  </a:ext>
+                </a:extLst>
+              </a:tr>
+              <a:tr h="182880">
+                <a:tc>
+                  <a:txBody>
+                    <a:bodyPr/>
+                    <a:lstStyle/>
+                    <a:p>
+                      <a:pPr algn="l" fontAlgn="b"/>
+                      <a:r>
+                        <a:rPr lang="en-US" sz="1100" b="0" i="0" u="none" strike="noStrike">
+                          <a:solidFill>
+                            <a:srgbClr val="000000"/>
+                          </a:solidFill>
+                          <a:effectLst/>
+                          <a:latin typeface="Calibri" panose="020F0502020204030204" pitchFamily="34" charset="0"/>
+                        </a:rPr>
+                        <a:t>DesignSpecificOutdoorAirFlowPerZoneFloorArea: Office_Outdoor</a:t>
+                      </a:r>
+                    </a:p>
+                  </a:txBody>
+                  <a:tcPr marL="7620" marR="7620" marT="7620" marB="0" anchor="b">
+                    <a:lnL>
+                      <a:noFill/>
+                    </a:lnL>
+                    <a:lnR>
+                      <a:noFill/>
+                    </a:lnR>
+                    <a:lnT>
+                      <a:noFill/>
+                    </a:lnT>
+                    <a:lnB>
+                      <a:noFill/>
+                    </a:lnB>
+                  </a:tcPr>
+                </a:tc>
+                <a:tc>
+                  <a:txBody>
+                    <a:bodyPr/>
+                    <a:lstStyle/>
+                    <a:p>
+                      <a:pPr algn="r" fontAlgn="b"/>
+                      <a:r>
+                        <a:rPr lang="en-US" sz="1100" b="0" i="0" u="none" strike="noStrike">
+                          <a:solidFill>
+                            <a:srgbClr val="000000"/>
+                          </a:solidFill>
+                          <a:effectLst/>
+                          <a:latin typeface="Calibri" panose="020F0502020204030204" pitchFamily="34" charset="0"/>
+                        </a:rPr>
+                        <a:t>-0.06098</a:t>
+                      </a:r>
+                    </a:p>
+                  </a:txBody>
+                  <a:tcPr marL="7620" marR="7620" marT="7620" marB="0" anchor="b">
+                    <a:lnL>
+                      <a:noFill/>
+                    </a:lnL>
+                    <a:lnR>
+                      <a:noFill/>
+                    </a:lnR>
+                    <a:lnT>
+                      <a:noFill/>
+                    </a:lnT>
+                    <a:lnB>
+                      <a:noFill/>
+                    </a:lnB>
+                  </a:tcPr>
+                </a:tc>
+                <a:tc>
+                  <a:txBody>
+                    <a:bodyPr/>
+                    <a:lstStyle/>
+                    <a:p>
+                      <a:pPr algn="r" fontAlgn="b"/>
+                      <a:r>
+                        <a:rPr lang="en-US" sz="1100" b="0" i="0" u="none" strike="noStrike">
+                          <a:solidFill>
+                            <a:srgbClr val="000000"/>
+                          </a:solidFill>
+                          <a:effectLst/>
+                          <a:latin typeface="Calibri" panose="020F0502020204030204" pitchFamily="34" charset="0"/>
+                        </a:rPr>
+                        <a:t>0.148089</a:t>
                       </a:r>
                     </a:p>
                   </a:txBody>
@@ -14691,7 +15233,7 @@
                           <a:effectLst/>
                           <a:latin typeface="Calibri" panose="020F0502020204030204" pitchFamily="34" charset="0"/>
                         </a:rPr>
-                        <a:t>2013.343</a:t>
+                        <a:t>0.185047</a:t>
                       </a:r>
                     </a:p>
                   </a:txBody>
@@ -14712,7 +15254,7 @@
                 </a:tc>
                 <a:extLst>
                   <a:ext uri="{0D108BD9-81ED-4DB2-BD59-A6C34878D82A}">
-                    <a16:rowId xmlns:a16="http://schemas.microsoft.com/office/drawing/2014/main" val="3090810034"/>
+                    <a16:rowId xmlns:a16="http://schemas.microsoft.com/office/drawing/2014/main" val="747884717"/>
                   </a:ext>
                 </a:extLst>
               </a:tr>
@@ -15023,10 +15565,10 @@
       </p:sp>
       <p:pic>
         <p:nvPicPr>
-          <p:cNvPr id="9" name="Picture 8">
+          <p:cNvPr id="5" name="Picture 4">
             <a:extLst>
               <a:ext uri="{FF2B5EF4-FFF2-40B4-BE49-F238E27FC236}">
-                <a16:creationId xmlns:a16="http://schemas.microsoft.com/office/drawing/2014/main" id="{8B62076C-F21A-4B19-ADBA-C1817582F785}"/>
+                <a16:creationId xmlns:a16="http://schemas.microsoft.com/office/drawing/2014/main" id="{8923183E-E28F-452E-B563-CFE7CB50D5BA}"/>
               </a:ext>
             </a:extLst>
           </p:cNvPr>
@@ -15043,8 +15585,8 @@
         </p:blipFill>
         <p:spPr>
           <a:xfrm>
-            <a:off x="838200" y="1915918"/>
-            <a:ext cx="3443258" cy="3383280"/>
+            <a:off x="685800" y="1837013"/>
+            <a:ext cx="3654624" cy="3657600"/>
           </a:xfrm>
           <a:prstGeom prst="rect">
             <a:avLst/>
@@ -15053,10 +15595,10 @@
       </p:pic>
       <p:pic>
         <p:nvPicPr>
-          <p:cNvPr id="10" name="Picture 9">
+          <p:cNvPr id="8" name="Picture 7">
             <a:extLst>
               <a:ext uri="{FF2B5EF4-FFF2-40B4-BE49-F238E27FC236}">
-                <a16:creationId xmlns:a16="http://schemas.microsoft.com/office/drawing/2014/main" id="{6A757A05-D9F7-4BD6-B568-C99E88CAAD61}"/>
+                <a16:creationId xmlns:a16="http://schemas.microsoft.com/office/drawing/2014/main" id="{4FE47246-0643-4942-AEEC-97B6B939F9E8}"/>
               </a:ext>
             </a:extLst>
           </p:cNvPr>
@@ -15073,8 +15615,8 @@
         </p:blipFill>
         <p:spPr>
           <a:xfrm>
-            <a:off x="4572000" y="1915918"/>
-            <a:ext cx="3454277" cy="3383280"/>
+            <a:off x="4495800" y="1837013"/>
+            <a:ext cx="3657600" cy="3657600"/>
           </a:xfrm>
           <a:prstGeom prst="rect">
             <a:avLst/>
@@ -15520,10 +16062,10 @@
       </p:pic>
       <p:grpSp>
         <p:nvGrpSpPr>
-          <p:cNvPr id="20" name="Group 19">
+          <p:cNvPr id="11" name="Group 10">
             <a:extLst>
               <a:ext uri="{FF2B5EF4-FFF2-40B4-BE49-F238E27FC236}">
-                <a16:creationId xmlns:a16="http://schemas.microsoft.com/office/drawing/2014/main" id="{848E8FDC-402C-43BF-881A-20E4551899DF}"/>
+                <a16:creationId xmlns:a16="http://schemas.microsoft.com/office/drawing/2014/main" id="{89D5227C-68C7-421B-884F-C6F4E81D9181}"/>
               </a:ext>
             </a:extLst>
           </p:cNvPr>
@@ -15532,18 +16074,18 @@
         </p:nvGrpSpPr>
         <p:grpSpPr>
           <a:xfrm>
-            <a:off x="4191000" y="4356947"/>
-            <a:ext cx="3886200" cy="1768523"/>
-            <a:chOff x="4284938" y="4083774"/>
-            <a:chExt cx="4474591" cy="2036287"/>
+            <a:off x="4537610" y="4110284"/>
+            <a:ext cx="2869121" cy="2289047"/>
+            <a:chOff x="4043362" y="1447800"/>
+            <a:chExt cx="2869121" cy="2289047"/>
           </a:xfrm>
         </p:grpSpPr>
         <p:pic>
           <p:nvPicPr>
-            <p:cNvPr id="13" name="Picture 12">
+            <p:cNvPr id="5" name="Picture 4">
               <a:extLst>
                 <a:ext uri="{FF2B5EF4-FFF2-40B4-BE49-F238E27FC236}">
-                  <a16:creationId xmlns:a16="http://schemas.microsoft.com/office/drawing/2014/main" id="{E4191DDF-29B0-4E55-B9EB-7D782685DEFB}"/>
+                  <a16:creationId xmlns:a16="http://schemas.microsoft.com/office/drawing/2014/main" id="{AD56C111-9D59-4506-8E20-DF10D29566BF}"/>
                 </a:ext>
               </a:extLst>
             </p:cNvPr>
@@ -15560,8 +16102,8 @@
           </p:blipFill>
           <p:spPr>
             <a:xfrm>
-              <a:off x="4284938" y="4083774"/>
-              <a:ext cx="809694" cy="2009775"/>
+              <a:off x="4043362" y="1447800"/>
+              <a:ext cx="609966" cy="2286000"/>
             </a:xfrm>
             <a:prstGeom prst="rect">
               <a:avLst/>
@@ -15570,10 +16112,10 @@
         </p:pic>
         <p:pic>
           <p:nvPicPr>
-            <p:cNvPr id="15" name="Picture 14">
+            <p:cNvPr id="6" name="Picture 5">
               <a:extLst>
                 <a:ext uri="{FF2B5EF4-FFF2-40B4-BE49-F238E27FC236}">
-                  <a16:creationId xmlns:a16="http://schemas.microsoft.com/office/drawing/2014/main" id="{4B92B5D9-E4D2-4B71-A450-5999928100D1}"/>
+                  <a16:creationId xmlns:a16="http://schemas.microsoft.com/office/drawing/2014/main" id="{B01C6B02-06D8-4330-B618-6FD32C8BB1E3}"/>
                 </a:ext>
               </a:extLst>
             </p:cNvPr>
@@ -15590,8 +16132,8 @@
           </p:blipFill>
           <p:spPr>
             <a:xfrm>
-              <a:off x="5082313" y="4110285"/>
-              <a:ext cx="803910" cy="2009776"/>
+              <a:off x="4712469" y="1447800"/>
+              <a:ext cx="581281" cy="2286000"/>
             </a:xfrm>
             <a:prstGeom prst="rect">
               <a:avLst/>
@@ -15600,10 +16142,10 @@
         </p:pic>
         <p:pic>
           <p:nvPicPr>
-            <p:cNvPr id="16" name="Picture 15">
+            <p:cNvPr id="8" name="Picture 7">
               <a:extLst>
                 <a:ext uri="{FF2B5EF4-FFF2-40B4-BE49-F238E27FC236}">
-                  <a16:creationId xmlns:a16="http://schemas.microsoft.com/office/drawing/2014/main" id="{A95927BB-9976-4F5B-AB0E-3C29E574A6F6}"/>
+                  <a16:creationId xmlns:a16="http://schemas.microsoft.com/office/drawing/2014/main" id="{87F7F387-9201-4BE9-9F78-B190842B697B}"/>
                 </a:ext>
               </a:extLst>
             </p:cNvPr>
@@ -15620,8 +16162,8 @@
           </p:blipFill>
           <p:spPr>
             <a:xfrm>
-              <a:off x="5886223" y="4110284"/>
-              <a:ext cx="947884" cy="1983265"/>
+              <a:off x="5348287" y="1450847"/>
+              <a:ext cx="793672" cy="2286000"/>
             </a:xfrm>
             <a:prstGeom prst="rect">
               <a:avLst/>
@@ -15630,10 +16172,10 @@
         </p:pic>
         <p:pic>
           <p:nvPicPr>
-            <p:cNvPr id="17" name="Picture 16">
+            <p:cNvPr id="10" name="Picture 9">
               <a:extLst>
                 <a:ext uri="{FF2B5EF4-FFF2-40B4-BE49-F238E27FC236}">
-                  <a16:creationId xmlns:a16="http://schemas.microsoft.com/office/drawing/2014/main" id="{A9CE159D-1DE9-44E5-B793-6981CD853636}"/>
+                  <a16:creationId xmlns:a16="http://schemas.microsoft.com/office/drawing/2014/main" id="{5C138199-ADF5-4CF7-BFFA-5DD10BC577A7}"/>
                 </a:ext>
               </a:extLst>
             </p:cNvPr>
@@ -15650,38 +16192,8 @@
           </p:blipFill>
           <p:spPr>
             <a:xfrm>
-              <a:off x="6792497" y="4110284"/>
-              <a:ext cx="994005" cy="2009777"/>
-            </a:xfrm>
-            <a:prstGeom prst="rect">
-              <a:avLst/>
-            </a:prstGeom>
-          </p:spPr>
-        </p:pic>
-        <p:pic>
-          <p:nvPicPr>
-            <p:cNvPr id="19" name="Picture 18">
-              <a:extLst>
-                <a:ext uri="{FF2B5EF4-FFF2-40B4-BE49-F238E27FC236}">
-                  <a16:creationId xmlns:a16="http://schemas.microsoft.com/office/drawing/2014/main" id="{1341A8DD-C01E-4518-866B-28259B244625}"/>
-                </a:ext>
-              </a:extLst>
-            </p:cNvPr>
-            <p:cNvPicPr>
-              <a:picLocks noChangeAspect="1"/>
-            </p:cNvPicPr>
-            <p:nvPr/>
-          </p:nvPicPr>
-          <p:blipFill>
-            <a:blip r:embed="rId9"/>
-            <a:stretch>
-              <a:fillRect/>
-            </a:stretch>
-          </p:blipFill>
-          <p:spPr>
-            <a:xfrm>
-              <a:off x="7778714" y="4110284"/>
-              <a:ext cx="980815" cy="1983265"/>
+              <a:off x="6148610" y="1447800"/>
+              <a:ext cx="763873" cy="2286000"/>
             </a:xfrm>
             <a:prstGeom prst="rect">
               <a:avLst/>

</xml_diff>